<commit_message>
Updated UI Component diagram
</commit_message>
<xml_diff>
--- a/docs/diagrams/UiComponentClassDiagram.pptx
+++ b/docs/diagrams/UiComponentClassDiagram.pptx
@@ -109,7 +109,7 @@
   </p:defaultTextStyle>
   <p:extLst>
     <p:ext uri="{EFAFB233-063F-42B5-8137-9DF3F51BA10A}">
-      <p15:sldGuideLst xmlns:p15="http://schemas.microsoft.com/office/powerpoint/2012/main">
+      <p15:sldGuideLst xmlns:p15="http://schemas.microsoft.com/office/powerpoint/2012/main" xmlns="">
         <p15:guide id="1" orient="horz" pos="1488">
           <p15:clr>
             <a:srgbClr val="A4A3A4"/>
@@ -208,7 +208,7 @@
           <a:p>
             <a:fld id="{F5CC4B3F-88C1-4FFA-B1B6-F41C21DC6924}" type="datetimeFigureOut">
               <a:rPr lang="en-US" smtClean="0"/>
-              <a:t>1/7/2017</a:t>
+              <a:t>10/18/17</a:t>
             </a:fld>
             <a:endParaRPr lang="en-US"/>
           </a:p>
@@ -654,7 +654,7 @@
           <a:p>
             <a:fld id="{78C97017-6FC3-485B-9764-EAC9E56C1D49}" type="datetimeFigureOut">
               <a:rPr lang="en-US" smtClean="0"/>
-              <a:t>1/7/2017</a:t>
+              <a:t>10/18/17</a:t>
             </a:fld>
             <a:endParaRPr lang="en-US"/>
           </a:p>
@@ -822,7 +822,7 @@
           <a:p>
             <a:fld id="{78C97017-6FC3-485B-9764-EAC9E56C1D49}" type="datetimeFigureOut">
               <a:rPr lang="en-US" smtClean="0"/>
-              <a:t>1/7/2017</a:t>
+              <a:t>10/18/17</a:t>
             </a:fld>
             <a:endParaRPr lang="en-US"/>
           </a:p>
@@ -1000,7 +1000,7 @@
           <a:p>
             <a:fld id="{78C97017-6FC3-485B-9764-EAC9E56C1D49}" type="datetimeFigureOut">
               <a:rPr lang="en-US" smtClean="0"/>
-              <a:t>1/7/2017</a:t>
+              <a:t>10/18/17</a:t>
             </a:fld>
             <a:endParaRPr lang="en-US"/>
           </a:p>
@@ -1168,7 +1168,7 @@
           <a:p>
             <a:fld id="{78C97017-6FC3-485B-9764-EAC9E56C1D49}" type="datetimeFigureOut">
               <a:rPr lang="en-US" smtClean="0"/>
-              <a:t>1/7/2017</a:t>
+              <a:t>10/18/17</a:t>
             </a:fld>
             <a:endParaRPr lang="en-US"/>
           </a:p>
@@ -1413,7 +1413,7 @@
           <a:p>
             <a:fld id="{78C97017-6FC3-485B-9764-EAC9E56C1D49}" type="datetimeFigureOut">
               <a:rPr lang="en-US" smtClean="0"/>
-              <a:t>1/7/2017</a:t>
+              <a:t>10/18/17</a:t>
             </a:fld>
             <a:endParaRPr lang="en-US"/>
           </a:p>
@@ -1698,7 +1698,7 @@
           <a:p>
             <a:fld id="{78C97017-6FC3-485B-9764-EAC9E56C1D49}" type="datetimeFigureOut">
               <a:rPr lang="en-US" smtClean="0"/>
-              <a:t>1/7/2017</a:t>
+              <a:t>10/18/17</a:t>
             </a:fld>
             <a:endParaRPr lang="en-US"/>
           </a:p>
@@ -2117,7 +2117,7 @@
           <a:p>
             <a:fld id="{78C97017-6FC3-485B-9764-EAC9E56C1D49}" type="datetimeFigureOut">
               <a:rPr lang="en-US" smtClean="0"/>
-              <a:t>1/7/2017</a:t>
+              <a:t>10/18/17</a:t>
             </a:fld>
             <a:endParaRPr lang="en-US"/>
           </a:p>
@@ -2234,7 +2234,7 @@
           <a:p>
             <a:fld id="{78C97017-6FC3-485B-9764-EAC9E56C1D49}" type="datetimeFigureOut">
               <a:rPr lang="en-US" smtClean="0"/>
-              <a:t>1/7/2017</a:t>
+              <a:t>10/18/17</a:t>
             </a:fld>
             <a:endParaRPr lang="en-US"/>
           </a:p>
@@ -2329,7 +2329,7 @@
           <a:p>
             <a:fld id="{78C97017-6FC3-485B-9764-EAC9E56C1D49}" type="datetimeFigureOut">
               <a:rPr lang="en-US" smtClean="0"/>
-              <a:t>1/7/2017</a:t>
+              <a:t>10/18/17</a:t>
             </a:fld>
             <a:endParaRPr lang="en-US"/>
           </a:p>
@@ -2604,7 +2604,7 @@
           <a:p>
             <a:fld id="{78C97017-6FC3-485B-9764-EAC9E56C1D49}" type="datetimeFigureOut">
               <a:rPr lang="en-US" smtClean="0"/>
-              <a:t>1/7/2017</a:t>
+              <a:t>10/18/17</a:t>
             </a:fld>
             <a:endParaRPr lang="en-US"/>
           </a:p>
@@ -2856,7 +2856,7 @@
           <a:p>
             <a:fld id="{78C97017-6FC3-485B-9764-EAC9E56C1D49}" type="datetimeFigureOut">
               <a:rPr lang="en-US" smtClean="0"/>
-              <a:t>1/7/2017</a:t>
+              <a:t>10/18/17</a:t>
             </a:fld>
             <a:endParaRPr lang="en-US"/>
           </a:p>
@@ -3067,7 +3067,7 @@
           <a:p>
             <a:fld id="{78C97017-6FC3-485B-9764-EAC9E56C1D49}" type="datetimeFigureOut">
               <a:rPr lang="en-US" smtClean="0"/>
-              <a:t>1/7/2017</a:t>
+              <a:t>10/18/17</a:t>
             </a:fld>
             <a:endParaRPr lang="en-US"/>
           </a:p>
@@ -4005,7 +4005,7 @@
         </p:nvSpPr>
         <p:spPr>
           <a:xfrm>
-            <a:off x="2592526" y="3991960"/>
+            <a:off x="2590800" y="4114800"/>
             <a:ext cx="1093635" cy="236841"/>
           </a:xfrm>
           <a:prstGeom prst="rect">
@@ -4065,7 +4065,7 @@
         </p:nvSpPr>
         <p:spPr>
           <a:xfrm>
-            <a:off x="3839323" y="4228801"/>
+            <a:off x="3886200" y="4343400"/>
             <a:ext cx="1040906" cy="236841"/>
           </a:xfrm>
           <a:prstGeom prst="rect">
@@ -4378,8 +4378,8 @@
         </p:nvCxnSpPr>
         <p:spPr>
           <a:xfrm rot="16200000" flipH="1">
-            <a:off x="1883148" y="3401003"/>
-            <a:ext cx="1242356" cy="176400"/>
+            <a:off x="1820865" y="3463286"/>
+            <a:ext cx="1365196" cy="174674"/>
           </a:xfrm>
           <a:prstGeom prst="bentConnector2">
             <a:avLst/>
@@ -4587,7 +4587,7 @@
           </a:prstGeom>
           <a:ln w="6350">
             <a:solidFill>
-              <a:schemeClr val="accent3"/>
+              <a:srgbClr val="9BBB59"/>
             </a:solidFill>
             <a:headEnd type="none" w="med" len="med"/>
             <a:tailEnd type="none" w="med" len="med"/>
@@ -4620,33 +4620,29 @@
         </p:nvCxnSpPr>
         <p:spPr>
           <a:xfrm rot="5400000">
-            <a:off x="4174488" y="2991741"/>
-            <a:ext cx="2061222" cy="649740"/>
+            <a:off x="4140628" y="3072479"/>
+            <a:ext cx="2175821" cy="602863"/>
           </a:xfrm>
           <a:prstGeom prst="bentConnector2">
             <a:avLst/>
           </a:prstGeom>
-          <a:ln w="6350">
-            <a:solidFill>
-              <a:schemeClr val="accent3"/>
-            </a:solidFill>
+          <a:ln>
             <a:headEnd type="none" w="med" len="med"/>
             <a:tailEnd type="none" w="med" len="med"/>
           </a:ln>
-          <a:effectLst/>
         </p:spPr>
         <p:style>
           <a:lnRef idx="1">
-            <a:schemeClr val="accent2"/>
+            <a:schemeClr val="accent3"/>
           </a:lnRef>
-          <a:fillRef idx="2">
-            <a:schemeClr val="accent2"/>
+          <a:fillRef idx="0">
+            <a:schemeClr val="accent3"/>
           </a:fillRef>
-          <a:effectRef idx="1">
-            <a:schemeClr val="accent2"/>
+          <a:effectRef idx="0">
+            <a:schemeClr val="accent3"/>
           </a:effectRef>
           <a:fontRef idx="minor">
-            <a:schemeClr val="dk1"/>
+            <a:schemeClr val="tx1"/>
           </a:fontRef>
         </p:style>
       </p:cxnSp>
@@ -5168,8 +5164,8 @@
         </p:nvCxnSpPr>
         <p:spPr>
           <a:xfrm rot="16200000" flipH="1">
-            <a:off x="3430123" y="3938021"/>
-            <a:ext cx="118421" cy="699979"/>
+            <a:off x="3456819" y="4032440"/>
+            <a:ext cx="110180" cy="748582"/>
           </a:xfrm>
           <a:prstGeom prst="bentConnector2">
             <a:avLst/>
@@ -5209,8 +5205,8 @@
         </p:nvCxnSpPr>
         <p:spPr>
           <a:xfrm rot="5400000">
-            <a:off x="3695875" y="2276286"/>
-            <a:ext cx="1824381" cy="1843808"/>
+            <a:off x="3633592" y="2336843"/>
+            <a:ext cx="1947221" cy="1845534"/>
           </a:xfrm>
           <a:prstGeom prst="bentConnector2">
             <a:avLst/>
@@ -5435,8 +5431,8 @@
         </p:nvSpPr>
         <p:spPr>
           <a:xfrm flipV="1">
-            <a:off x="4114799" y="4472708"/>
-            <a:ext cx="2642195" cy="101600"/>
+            <a:off x="4267200" y="4572000"/>
+            <a:ext cx="2468880" cy="177800"/>
           </a:xfrm>
           <a:custGeom>
             <a:avLst/>
@@ -5509,6 +5505,271 @@
           </a:p>
         </p:txBody>
       </p:sp>
+      <p:cxnSp>
+        <p:nvCxnSpPr>
+          <p:cNvPr id="48" name="Elbow Connector 47"/>
+          <p:cNvCxnSpPr/>
+          <p:nvPr/>
+        </p:nvCxnSpPr>
+        <p:spPr>
+          <a:xfrm rot="16200000" flipH="1">
+            <a:off x="3443401" y="3566999"/>
+            <a:ext cx="110180" cy="748582"/>
+          </a:xfrm>
+          <a:prstGeom prst="bentConnector2">
+            <a:avLst/>
+          </a:prstGeom>
+          <a:ln w="19050">
+            <a:solidFill>
+              <a:schemeClr val="accent3"/>
+            </a:solidFill>
+            <a:headEnd type="none" w="med" len="med"/>
+            <a:tailEnd type="arrow" w="med" len="med"/>
+          </a:ln>
+          <a:effectLst/>
+        </p:spPr>
+        <p:style>
+          <a:lnRef idx="1">
+            <a:schemeClr val="accent2"/>
+          </a:lnRef>
+          <a:fillRef idx="2">
+            <a:schemeClr val="accent2"/>
+          </a:fillRef>
+          <a:effectRef idx="1">
+            <a:schemeClr val="accent2"/>
+          </a:effectRef>
+          <a:fontRef idx="minor">
+            <a:schemeClr val="dk1"/>
+          </a:fontRef>
+        </p:style>
+      </p:cxnSp>
+      <p:sp>
+        <p:nvSpPr>
+          <p:cNvPr id="49" name="Rectangle 11"/>
+          <p:cNvSpPr/>
+          <p:nvPr/>
+        </p:nvSpPr>
+        <p:spPr>
+          <a:xfrm>
+            <a:off x="3886200" y="3886200"/>
+            <a:ext cx="1040906" cy="236841"/>
+          </a:xfrm>
+          <a:prstGeom prst="rect">
+            <a:avLst/>
+          </a:prstGeom>
+          <a:ln w="19050">
+            <a:solidFill>
+              <a:schemeClr val="accent3"/>
+            </a:solidFill>
+          </a:ln>
+          <a:effectLst/>
+        </p:spPr>
+        <p:style>
+          <a:lnRef idx="1">
+            <a:schemeClr val="accent3"/>
+          </a:lnRef>
+          <a:fillRef idx="2">
+            <a:schemeClr val="accent3"/>
+          </a:fillRef>
+          <a:effectRef idx="1">
+            <a:schemeClr val="accent3"/>
+          </a:effectRef>
+          <a:fontRef idx="minor">
+            <a:schemeClr val="dk1"/>
+          </a:fontRef>
+        </p:style>
+        <p:txBody>
+          <a:bodyPr rtlCol="0" anchor="ctr"/>
+          <a:lstStyle/>
+          <a:p>
+            <a:pPr algn="ctr"/>
+            <a:r>
+              <a:rPr lang="en-US" sz="1050" b="1" dirty="0" err="1">
+                <a:solidFill>
+                  <a:schemeClr val="accent3">
+                    <a:lumMod val="75000"/>
+                  </a:schemeClr>
+                </a:solidFill>
+              </a:rPr>
+              <a:t>Birthday</a:t>
+            </a:r>
+            <a:r>
+              <a:rPr lang="en-US" sz="1050" b="1" dirty="0" err="1">
+                <a:solidFill>
+                  <a:schemeClr val="accent3">
+                    <a:lumMod val="75000"/>
+                  </a:schemeClr>
+                </a:solidFill>
+              </a:rPr>
+              <a:t>Card</a:t>
+            </a:r>
+            <a:endParaRPr lang="en-SG" sz="1050" b="1" dirty="0">
+              <a:solidFill>
+                <a:schemeClr val="accent3">
+                  <a:lumMod val="75000"/>
+                </a:schemeClr>
+              </a:solidFill>
+            </a:endParaRPr>
+          </a:p>
+        </p:txBody>
+      </p:sp>
+      <p:sp>
+        <p:nvSpPr>
+          <p:cNvPr id="51" name="Freeform 50"/>
+          <p:cNvSpPr/>
+          <p:nvPr/>
+        </p:nvSpPr>
+        <p:spPr>
+          <a:xfrm flipV="1">
+            <a:off x="4191000" y="4114800"/>
+            <a:ext cx="2542032" cy="177800"/>
+          </a:xfrm>
+          <a:custGeom>
+            <a:avLst/>
+            <a:gdLst>
+              <a:gd name="connsiteX0" fmla="*/ 0 w 3048000"/>
+              <a:gd name="connsiteY0" fmla="*/ 203200 h 203200"/>
+              <a:gd name="connsiteX1" fmla="*/ 221673 w 3048000"/>
+              <a:gd name="connsiteY1" fmla="*/ 0 h 203200"/>
+              <a:gd name="connsiteX2" fmla="*/ 3048000 w 3048000"/>
+              <a:gd name="connsiteY2" fmla="*/ 0 h 203200"/>
+            </a:gdLst>
+            <a:ahLst/>
+            <a:cxnLst>
+              <a:cxn ang="0">
+                <a:pos x="connsiteX0" y="connsiteY0"/>
+              </a:cxn>
+              <a:cxn ang="0">
+                <a:pos x="connsiteX1" y="connsiteY1"/>
+              </a:cxn>
+              <a:cxn ang="0">
+                <a:pos x="connsiteX2" y="connsiteY2"/>
+              </a:cxn>
+            </a:cxnLst>
+            <a:rect l="l" t="t" r="r" b="b"/>
+            <a:pathLst>
+              <a:path w="3048000" h="203200">
+                <a:moveTo>
+                  <a:pt x="0" y="203200"/>
+                </a:moveTo>
+                <a:lnTo>
+                  <a:pt x="221673" y="0"/>
+                </a:lnTo>
+                <a:lnTo>
+                  <a:pt x="3048000" y="0"/>
+                </a:lnTo>
+              </a:path>
+            </a:pathLst>
+          </a:custGeom>
+          <a:noFill/>
+          <a:ln w="19050">
+            <a:solidFill>
+              <a:schemeClr val="accent3"/>
+            </a:solidFill>
+            <a:prstDash val="sysDot"/>
+            <a:headEnd type="none" w="med" len="med"/>
+            <a:tailEnd type="arrow" w="med" len="med"/>
+          </a:ln>
+          <a:effectLst/>
+        </p:spPr>
+        <p:style>
+          <a:lnRef idx="1">
+            <a:schemeClr val="accent2"/>
+          </a:lnRef>
+          <a:fillRef idx="2">
+            <a:schemeClr val="accent2"/>
+          </a:fillRef>
+          <a:effectRef idx="1">
+            <a:schemeClr val="accent2"/>
+          </a:effectRef>
+          <a:fontRef idx="minor">
+            <a:schemeClr val="dk1"/>
+          </a:fontRef>
+        </p:style>
+        <p:txBody>
+          <a:bodyPr rtlCol="0" anchor="ctr"/>
+          <a:lstStyle/>
+          <a:p>
+            <a:pPr algn="ctr"/>
+            <a:endParaRPr lang="en-SG"/>
+          </a:p>
+        </p:txBody>
+      </p:sp>
+      <p:cxnSp>
+        <p:nvCxnSpPr>
+          <p:cNvPr id="12" name="Straight Connector 11"/>
+          <p:cNvCxnSpPr>
+            <a:stCxn id="49" idx="3"/>
+            <a:endCxn id="49" idx="3"/>
+          </p:cNvCxnSpPr>
+          <p:nvPr/>
+        </p:nvCxnSpPr>
+        <p:spPr>
+          <a:xfrm>
+            <a:off x="4927106" y="4004621"/>
+            <a:ext cx="0" cy="0"/>
+          </a:xfrm>
+          <a:prstGeom prst="line">
+            <a:avLst/>
+          </a:prstGeom>
+        </p:spPr>
+        <p:style>
+          <a:lnRef idx="2">
+            <a:schemeClr val="accent1"/>
+          </a:lnRef>
+          <a:fillRef idx="0">
+            <a:schemeClr val="accent1"/>
+          </a:fillRef>
+          <a:effectRef idx="1">
+            <a:schemeClr val="accent1"/>
+          </a:effectRef>
+          <a:fontRef idx="minor">
+            <a:schemeClr val="tx1"/>
+          </a:fontRef>
+        </p:style>
+      </p:cxnSp>
+      <p:cxnSp>
+        <p:nvCxnSpPr>
+          <p:cNvPr id="52" name="Straight Connector 51"/>
+          <p:cNvCxnSpPr/>
+          <p:nvPr/>
+        </p:nvCxnSpPr>
+        <p:spPr>
+          <a:xfrm>
+            <a:off x="4937760" y="3995928"/>
+            <a:ext cx="594360" cy="0"/>
+          </a:xfrm>
+          <a:prstGeom prst="line">
+            <a:avLst/>
+          </a:prstGeom>
+          <a:ln w="9525">
+            <a:solidFill>
+              <a:srgbClr val="9BBB59"/>
+            </a:solidFill>
+          </a:ln>
+          <a:effectLst>
+            <a:outerShdw blurRad="40000" dist="20000" dir="5400000" rotWithShape="0">
+              <a:schemeClr val="bg1">
+                <a:alpha val="38000"/>
+              </a:schemeClr>
+            </a:outerShdw>
+          </a:effectLst>
+        </p:spPr>
+        <p:style>
+          <a:lnRef idx="2">
+            <a:schemeClr val="accent1"/>
+          </a:lnRef>
+          <a:fillRef idx="0">
+            <a:schemeClr val="accent1"/>
+          </a:fillRef>
+          <a:effectRef idx="1">
+            <a:schemeClr val="accent1"/>
+          </a:effectRef>
+          <a:fontRef idx="minor">
+            <a:schemeClr val="tx1"/>
+          </a:fontRef>
+        </p:style>
+      </p:cxnSp>
     </p:spTree>
     <p:extLst>
       <p:ext uri="{BB962C8B-B14F-4D97-AF65-F5344CB8AC3E}">

</xml_diff>